<commit_message>
Minor change in x-axis because the numbers were not shown finely
</commit_message>
<xml_diff>
--- a/Weekly Meetings/HEP_Weekly_6December2019.pptx
+++ b/Weekly Meetings/HEP_Weekly_6December2019.pptx
@@ -209,7 +209,7 @@
           <a:p>
             <a:fld id="{8CD5EADE-870B-3C4D-92F6-FE927CFCE2A1}" type="datetime1">
               <a:rPr lang="en-US" smtClean="0"/>
-              <a:t>12/3/19</a:t>
+              <a:t>12/5/19</a:t>
             </a:fld>
             <a:endParaRPr lang="en-GB"/>
           </a:p>
@@ -415,7 +415,7 @@
           <a:p>
             <a:fld id="{4A3A8317-869C-EC49-8CB2-3286EE886873}" type="datetime1">
               <a:rPr lang="en-US" smtClean="0"/>
-              <a:t>12/3/19</a:t>
+              <a:t>12/5/19</a:t>
             </a:fld>
             <a:endParaRPr lang="en-GB"/>
           </a:p>
@@ -749,7 +749,7 @@
           <a:p>
             <a:fld id="{B49D5E6A-E658-F947-B519-3BD764463DDB}" type="datetime1">
               <a:rPr lang="en-US" smtClean="0"/>
-              <a:t>12/3/19</a:t>
+              <a:t>12/5/19</a:t>
             </a:fld>
             <a:endParaRPr lang="en-GB"/>
           </a:p>
@@ -1017,7 +1017,7 @@
           <a:p>
             <a:fld id="{3FD6B7D5-59BD-A94A-8259-AFB77C1C6F6C}" type="datetime1">
               <a:rPr lang="en-US" smtClean="0"/>
-              <a:t>12/3/19</a:t>
+              <a:t>12/5/19</a:t>
             </a:fld>
             <a:endParaRPr lang="en-US" dirty="0"/>
           </a:p>
@@ -1224,7 +1224,7 @@
           <a:p>
             <a:fld id="{22747042-83B4-2D44-B16D-692521656AEA}" type="datetime1">
               <a:rPr lang="en-US" smtClean="0"/>
-              <a:t>12/3/19</a:t>
+              <a:t>12/5/19</a:t>
             </a:fld>
             <a:endParaRPr lang="en-US" dirty="0"/>
           </a:p>
@@ -1479,7 +1479,7 @@
           <a:p>
             <a:fld id="{123C6174-D222-ED47-AF35-85B52783FDE1}" type="datetime1">
               <a:rPr lang="en-US" smtClean="0"/>
-              <a:t>12/3/19</a:t>
+              <a:t>12/5/19</a:t>
             </a:fld>
             <a:endParaRPr lang="en-US" dirty="0"/>
           </a:p>
@@ -1670,7 +1670,7 @@
           <a:p>
             <a:fld id="{92BB3830-AA68-4343-953F-F849943EB849}" type="datetime1">
               <a:rPr lang="en-US" smtClean="0"/>
-              <a:t>12/3/19</a:t>
+              <a:t>12/5/19</a:t>
             </a:fld>
             <a:endParaRPr lang="en-GB"/>
           </a:p>
@@ -1844,7 +1844,7 @@
           <a:p>
             <a:fld id="{13F0FE4D-A637-F644-BCB7-BB01E9473082}" type="datetime1">
               <a:rPr lang="en-US" smtClean="0"/>
-              <a:t>12/3/19</a:t>
+              <a:t>12/5/19</a:t>
             </a:fld>
             <a:endParaRPr lang="en-GB"/>
           </a:p>
@@ -2094,7 +2094,7 @@
           <a:p>
             <a:fld id="{7916914C-F633-3B4D-8E7C-AF9878FBCAB2}" type="datetime1">
               <a:rPr lang="en-US" smtClean="0"/>
-              <a:t>12/3/19</a:t>
+              <a:t>12/5/19</a:t>
             </a:fld>
             <a:endParaRPr lang="en-GB"/>
           </a:p>
@@ -2330,7 +2330,7 @@
           <a:p>
             <a:fld id="{1BEE493E-6ECC-2D49-AA37-47715FC69928}" type="datetime1">
               <a:rPr lang="en-US" smtClean="0"/>
-              <a:t>12/3/19</a:t>
+              <a:t>12/5/19</a:t>
             </a:fld>
             <a:endParaRPr lang="en-GB"/>
           </a:p>
@@ -2701,7 +2701,7 @@
           <a:p>
             <a:fld id="{44D2375D-BCDA-CD42-A7D1-F6C0DA2CE615}" type="datetime1">
               <a:rPr lang="en-US" smtClean="0"/>
-              <a:t>12/3/19</a:t>
+              <a:t>12/5/19</a:t>
             </a:fld>
             <a:endParaRPr lang="en-GB"/>
           </a:p>
@@ -2823,7 +2823,7 @@
           <a:p>
             <a:fld id="{DF706FF0-E883-3242-B340-EF59CDD02701}" type="datetime1">
               <a:rPr lang="en-US" smtClean="0"/>
-              <a:t>12/3/19</a:t>
+              <a:t>12/5/19</a:t>
             </a:fld>
             <a:endParaRPr lang="en-GB"/>
           </a:p>
@@ -2922,7 +2922,7 @@
           <a:p>
             <a:fld id="{A72B1547-4678-7444-8B0B-D61236993AA6}" type="datetime1">
               <a:rPr lang="en-US" smtClean="0"/>
-              <a:t>12/3/19</a:t>
+              <a:t>12/5/19</a:t>
             </a:fld>
             <a:endParaRPr lang="en-GB"/>
           </a:p>
@@ -3203,7 +3203,7 @@
           <a:p>
             <a:fld id="{F5C0FF04-D16D-9545-B9FE-2A2509161914}" type="datetime1">
               <a:rPr lang="en-US" smtClean="0"/>
-              <a:t>12/3/19</a:t>
+              <a:t>12/5/19</a:t>
             </a:fld>
             <a:endParaRPr lang="en-GB"/>
           </a:p>
@@ -3359,7 +3359,7 @@
           <a:p>
             <a:fld id="{739BCA09-01A4-7D40-97AF-A677405590ED}" type="datetime1">
               <a:rPr lang="en-US" smtClean="0"/>
-              <a:t>12/3/19</a:t>
+              <a:t>12/5/19</a:t>
             </a:fld>
             <a:endParaRPr lang="en-US" dirty="0"/>
           </a:p>
@@ -3640,7 +3640,7 @@
           <a:p>
             <a:fld id="{95430EDC-66BF-5B4F-9F6B-EF430B2635C2}" type="datetime1">
               <a:rPr lang="en-US" smtClean="0"/>
-              <a:t>12/3/19</a:t>
+              <a:t>12/5/19</a:t>
             </a:fld>
             <a:endParaRPr lang="en-GB"/>
           </a:p>
@@ -3814,7 +3814,7 @@
           <a:p>
             <a:fld id="{C40C6D0C-61E5-A14E-AA64-932059ABBCA0}" type="datetime1">
               <a:rPr lang="en-US" smtClean="0"/>
-              <a:t>12/3/19</a:t>
+              <a:t>12/5/19</a:t>
             </a:fld>
             <a:endParaRPr lang="en-GB"/>
           </a:p>
@@ -3998,7 +3998,7 @@
           <a:p>
             <a:fld id="{686993B2-94FA-8143-ACBD-1339E5A7C63D}" type="datetime1">
               <a:rPr lang="en-US" smtClean="0"/>
-              <a:t>12/3/19</a:t>
+              <a:t>12/5/19</a:t>
             </a:fld>
             <a:endParaRPr lang="en-GB"/>
           </a:p>
@@ -4345,7 +4345,7 @@
           <a:p>
             <a:fld id="{887F3A82-5004-DE46-9B8F-C8D1AE47BCDD}" type="datetime1">
               <a:rPr lang="en-US" smtClean="0"/>
-              <a:t>12/3/19</a:t>
+              <a:t>12/5/19</a:t>
             </a:fld>
             <a:endParaRPr lang="en-US" dirty="0"/>
           </a:p>
@@ -4619,7 +4619,7 @@
           <a:p>
             <a:fld id="{9609816B-101F-E649-A6DB-1B34F62305FD}" type="datetime1">
               <a:rPr lang="en-US" smtClean="0"/>
-              <a:t>12/3/19</a:t>
+              <a:t>12/5/19</a:t>
             </a:fld>
             <a:endParaRPr lang="en-US" dirty="0"/>
           </a:p>
@@ -4997,7 +4997,7 @@
           <a:p>
             <a:fld id="{B4B9C9C3-E10A-4046-99D1-D14A01669CB5}" type="datetime1">
               <a:rPr lang="en-US" smtClean="0"/>
-              <a:t>12/3/19</a:t>
+              <a:t>12/5/19</a:t>
             </a:fld>
             <a:endParaRPr lang="en-US" dirty="0"/>
           </a:p>
@@ -5114,7 +5114,7 @@
           <a:p>
             <a:fld id="{B20DF165-EA06-4348-9825-CC0EB7B994A5}" type="datetime1">
               <a:rPr lang="en-US" smtClean="0"/>
-              <a:t>12/3/19</a:t>
+              <a:t>12/5/19</a:t>
             </a:fld>
             <a:endParaRPr lang="en-US" dirty="0"/>
           </a:p>
@@ -5284,7 +5284,7 @@
           <a:p>
             <a:fld id="{BC939BB5-C2A2-354E-94F1-11C8ABC84871}" type="datetime1">
               <a:rPr lang="en-US" smtClean="0"/>
-              <a:t>12/3/19</a:t>
+              <a:t>12/5/19</a:t>
             </a:fld>
             <a:endParaRPr lang="en-US" dirty="0"/>
           </a:p>
@@ -5668,7 +5668,7 @@
           <a:p>
             <a:fld id="{6BC13A68-213D-F04B-9D09-F80EB8CDDAAA}" type="datetime1">
               <a:rPr lang="en-US" smtClean="0"/>
-              <a:t>12/3/19</a:t>
+              <a:t>12/5/19</a:t>
             </a:fld>
             <a:endParaRPr lang="en-US" dirty="0"/>
           </a:p>
@@ -6050,7 +6050,7 @@
           <a:p>
             <a:fld id="{3C9CB665-2448-6244-98A5-6DB781AF1920}" type="datetime1">
               <a:rPr lang="en-US" smtClean="0"/>
-              <a:t>12/3/19</a:t>
+              <a:t>12/5/19</a:t>
             </a:fld>
             <a:endParaRPr lang="en-US" dirty="0"/>
           </a:p>
@@ -6336,7 +6336,7 @@
           <a:p>
             <a:fld id="{0675E229-76FC-AB46-B5B7-99D6369AD45B}" type="datetime1">
               <a:rPr lang="en-US" smtClean="0"/>
-              <a:t>12/3/19</a:t>
+              <a:t>12/5/19</a:t>
             </a:fld>
             <a:endParaRPr lang="en-US" dirty="0"/>
           </a:p>
@@ -7026,7 +7026,7 @@
           <a:p>
             <a:fld id="{69C84D11-6659-6A4A-919D-F211F249C3CD}" type="datetime1">
               <a:rPr lang="en-US" smtClean="0"/>
-              <a:t>12/3/19</a:t>
+              <a:t>12/5/19</a:t>
             </a:fld>
             <a:endParaRPr lang="en-GB"/>
           </a:p>
@@ -7665,8 +7665,8 @@
           </a:p>
         </p:txBody>
       </p:sp>
-      <mc:AlternateContent xmlns:mc="http://schemas.openxmlformats.org/markup-compatibility/2006">
-        <mc:Choice xmlns:a14="http://schemas.microsoft.com/office/drawing/2010/main" Requires="a14">
+      <mc:AlternateContent xmlns:mc="http://schemas.openxmlformats.org/markup-compatibility/2006" xmlns:a14="http://schemas.microsoft.com/office/drawing/2010/main">
+        <mc:Choice Requires="a14">
           <p:sp>
             <p:nvSpPr>
               <p:cNvPr id="14" name="TextBox 13"/>
@@ -8098,7 +8098,7 @@
             </p:txBody>
           </p:sp>
         </mc:Choice>
-        <mc:Fallback>
+        <mc:Fallback xmlns="">
           <p:sp>
             <p:nvSpPr>
               <p:cNvPr id="14" name="TextBox 13"/>
@@ -10341,7 +10341,7 @@
           <a:p>
             <a:fld id="{A495A033-A54B-4F41-92C4-F7053274BB0C}" type="datetime1">
               <a:rPr lang="en-US" smtClean="0"/>
-              <a:t>12/3/19</a:t>
+              <a:t>12/5/19</a:t>
             </a:fld>
             <a:endParaRPr lang="en-US" dirty="0"/>
           </a:p>
@@ -10697,7 +10697,7 @@
           <a:p>
             <a:fld id="{863596AC-079A-914A-A4AA-F10BF720D55E}" type="datetime1">
               <a:rPr lang="en-US" smtClean="0"/>
-              <a:t>12/3/19</a:t>
+              <a:t>12/5/19</a:t>
             </a:fld>
             <a:endParaRPr lang="en-US" dirty="0"/>
           </a:p>
@@ -11303,7 +11303,7 @@
           <a:p>
             <a:fld id="{863596AC-079A-914A-A4AA-F10BF720D55E}" type="datetime1">
               <a:rPr lang="en-US" smtClean="0"/>
-              <a:t>12/3/19</a:t>
+              <a:t>12/5/19</a:t>
             </a:fld>
             <a:endParaRPr lang="en-US" dirty="0"/>
           </a:p>
@@ -13012,14 +13012,14 @@
           <a:p>
             <a:fld id="{863596AC-079A-914A-A4AA-F10BF720D55E}" type="datetime1">
               <a:rPr lang="en-US" smtClean="0"/>
-              <a:t>12/3/19</a:t>
+              <a:t>12/5/19</a:t>
             </a:fld>
             <a:endParaRPr lang="en-US" dirty="0"/>
           </a:p>
         </p:txBody>
       </p:sp>
-      <mc:AlternateContent xmlns:mc="http://schemas.openxmlformats.org/markup-compatibility/2006">
-        <mc:Choice xmlns:a14="http://schemas.microsoft.com/office/drawing/2010/main" Requires="a14">
+      <mc:AlternateContent xmlns:mc="http://schemas.openxmlformats.org/markup-compatibility/2006" xmlns:a14="http://schemas.microsoft.com/office/drawing/2010/main">
+        <mc:Choice Requires="a14">
           <p:sp>
             <p:nvSpPr>
               <p:cNvPr id="3" name="TextBox 2">
@@ -13074,6 +13074,7 @@
                 </a:r>
               </a:p>
               <a:p>
+                <a:pPr/>
                 <a14:m>
                   <m:oMathPara xmlns:m="http://schemas.openxmlformats.org/officeDocument/2006/math">
                     <m:oMathParaPr>
@@ -13428,6 +13429,7 @@
                 <a:endParaRPr lang="en-US" dirty="0"/>
               </a:p>
               <a:p>
+                <a:pPr/>
                 <a14:m>
                   <m:oMathPara xmlns:m="http://schemas.openxmlformats.org/officeDocument/2006/math">
                     <m:oMathParaPr>
@@ -13500,13 +13502,7 @@
                         <a:rPr lang="en-US" i="1">
                           <a:latin typeface="Cambria Math" panose="02040503050406030204" pitchFamily="18" charset="0"/>
                         </a:rPr>
-                        <m:t> </m:t>
-                      </m:r>
-                      <m:r>
-                        <a:rPr lang="en-US" i="1">
-                          <a:latin typeface="Cambria Math" panose="02040503050406030204" pitchFamily="18" charset="0"/>
-                        </a:rPr>
-                        <m:t>= </m:t>
+                        <m:t> = </m:t>
                       </m:r>
                       <m:f>
                         <m:fPr>
@@ -13731,7 +13727,7 @@
             </p:txBody>
           </p:sp>
         </mc:Choice>
-        <mc:Fallback>
+        <mc:Fallback xmlns="">
           <p:sp>
             <p:nvSpPr>
               <p:cNvPr id="3" name="TextBox 2">
@@ -14351,8 +14347,8 @@
         </p:nvSpPr>
         <p:spPr>
           <a:xfrm>
-            <a:off x="7836088" y="1746114"/>
-            <a:ext cx="1844722" cy="1330657"/>
+            <a:off x="7836088" y="1746115"/>
+            <a:ext cx="1844722" cy="1259024"/>
           </a:xfrm>
           <a:prstGeom prst="rect">
             <a:avLst/>
@@ -14695,8 +14691,8 @@
           </a:fontRef>
         </p:style>
       </p:cxnSp>
-      <mc:AlternateContent xmlns:mc="http://schemas.openxmlformats.org/markup-compatibility/2006">
-        <mc:Choice xmlns:a14="http://schemas.microsoft.com/office/drawing/2010/main" Requires="a14">
+      <mc:AlternateContent xmlns:mc="http://schemas.openxmlformats.org/markup-compatibility/2006" xmlns:a14="http://schemas.microsoft.com/office/drawing/2010/main">
+        <mc:Choice Requires="a14">
           <p:sp>
             <p:nvSpPr>
               <p:cNvPr id="52" name="TextBox 51">
@@ -14725,6 +14721,7 @@
               </a:bodyPr>
               <a:lstStyle/>
               <a:p>
+                <a:pPr/>
                 <a14:m>
                   <m:oMathPara xmlns:m="http://schemas.openxmlformats.org/officeDocument/2006/math">
                     <m:oMathParaPr>
@@ -14887,7 +14884,7 @@
             </p:txBody>
           </p:sp>
         </mc:Choice>
-        <mc:Fallback>
+        <mc:Fallback xmlns="">
           <p:sp>
             <p:nvSpPr>
               <p:cNvPr id="52" name="TextBox 51">
@@ -15445,7 +15442,7 @@
           <a:p>
             <a:fld id="{863596AC-079A-914A-A4AA-F10BF720D55E}" type="datetime1">
               <a:rPr lang="en-US" smtClean="0"/>
-              <a:t>12/3/19</a:t>
+              <a:t>12/5/19</a:t>
             </a:fld>
             <a:endParaRPr lang="en-US" dirty="0"/>
           </a:p>

</xml_diff>